<commit_message>
Präsentation an DB angepasst, Ausarbeitung  Konzeption
</commit_message>
<xml_diff>
--- a/docs/HTW-Quiz (Abschlusspräsentation).pptx
+++ b/docs/HTW-Quiz (Abschlusspräsentation).pptx
@@ -18953,7 +18953,7 @@
           <a:p>
             <a:fld id="{EC1BB0AA-FFD6-8349-BA5F-8D8AC7EFA371}" type="datetimeFigureOut">
               <a:rPr lang="de-DE" smtClean="0"/>
-              <a:t>24.08.2018</a:t>
+              <a:t>25.08.2018</a:t>
             </a:fld>
             <a:endParaRPr lang="de-DE"/>
           </a:p>
@@ -19119,7 +19119,7 @@
             <a:fld id="{7BF062F9-8B9D-488C-A30E-01E8F5B28DD8}" type="datetimeFigureOut">
               <a:rPr lang="de-DE" smtClean="0"/>
               <a:pPr/>
-              <a:t>24.08.2018</a:t>
+              <a:t>25.08.2018</a:t>
             </a:fld>
             <a:endParaRPr lang="de-DE"/>
           </a:p>
@@ -29192,8 +29192,8 @@
         </p:blipFill>
         <p:spPr>
           <a:xfrm>
-            <a:off x="3007748" y="810766"/>
-            <a:ext cx="3057252" cy="5724059"/>
+            <a:off x="2789499" y="763853"/>
+            <a:ext cx="3275501" cy="5454451"/>
           </a:xfrm>
           <a:prstGeom prst="rect">
             <a:avLst/>
@@ -29689,15 +29689,21 @@
           <p:nvPr/>
         </p:nvPicPr>
         <p:blipFill>
-          <a:blip r:embed="rId3"/>
+          <a:blip r:embed="rId3">
+            <a:extLst>
+              <a:ext uri="{28A0092B-C50C-407E-A947-70E740481C1C}">
+                <a14:useLocalDpi xmlns:a14="http://schemas.microsoft.com/office/drawing/2010/main" val="0"/>
+              </a:ext>
+            </a:extLst>
+          </a:blip>
           <a:stretch>
             <a:fillRect/>
           </a:stretch>
         </p:blipFill>
         <p:spPr>
           <a:xfrm>
-            <a:off x="500062" y="1214437"/>
-            <a:ext cx="8143875" cy="4429125"/>
+            <a:off x="664801" y="1392817"/>
+            <a:ext cx="8109541" cy="4461793"/>
           </a:xfrm>
           <a:prstGeom prst="rect">
             <a:avLst/>

</xml_diff>